<commit_message>
Added presentation qLearning part
</commit_message>
<xml_diff>
--- a/Projekt/Presentation/Thomas.pptx
+++ b/Projekt/Presentation/Thomas.pptx
@@ -5,7 +5,8 @@
     <p:sldMasterId id="2147483648" r:id="rId1"/>
   </p:sldMasterIdLst>
   <p:sldIdLst>
-    <p:sldId id="256" r:id="rId2"/>
+    <p:sldId id="257" r:id="rId2"/>
+    <p:sldId id="258" r:id="rId3"/>
   </p:sldIdLst>
   <p:sldSz cx="12192000" cy="6858000"/>
   <p:notesSz cx="6858000" cy="9144000"/>
@@ -238,7 +239,7 @@
           <a:p>
             <a:fld id="{881BAD53-E61D-164B-8191-DDA767D1A845}" type="datetimeFigureOut">
               <a:rPr lang="de-DE" smtClean="0"/>
-              <a:t>10.07.16</a:t>
+              <a:t>11.07.2016</a:t>
             </a:fld>
             <a:endParaRPr lang="de-DE"/>
           </a:p>
@@ -280,7 +281,7 @@
           <a:p>
             <a:fld id="{4AF698C7-F98E-7545-B8D5-444C8D9537E9}" type="slidenum">
               <a:rPr lang="de-DE" smtClean="0"/>
-              <a:t>‹#›</a:t>
+              <a:t>‹Nr.›</a:t>
             </a:fld>
             <a:endParaRPr lang="de-DE"/>
           </a:p>
@@ -408,7 +409,7 @@
           <a:p>
             <a:fld id="{881BAD53-E61D-164B-8191-DDA767D1A845}" type="datetimeFigureOut">
               <a:rPr lang="de-DE" smtClean="0"/>
-              <a:t>10.07.16</a:t>
+              <a:t>11.07.2016</a:t>
             </a:fld>
             <a:endParaRPr lang="de-DE"/>
           </a:p>
@@ -450,7 +451,7 @@
           <a:p>
             <a:fld id="{4AF698C7-F98E-7545-B8D5-444C8D9537E9}" type="slidenum">
               <a:rPr lang="de-DE" smtClean="0"/>
-              <a:t>‹#›</a:t>
+              <a:t>‹Nr.›</a:t>
             </a:fld>
             <a:endParaRPr lang="de-DE"/>
           </a:p>
@@ -588,7 +589,7 @@
           <a:p>
             <a:fld id="{881BAD53-E61D-164B-8191-DDA767D1A845}" type="datetimeFigureOut">
               <a:rPr lang="de-DE" smtClean="0"/>
-              <a:t>10.07.16</a:t>
+              <a:t>11.07.2016</a:t>
             </a:fld>
             <a:endParaRPr lang="de-DE"/>
           </a:p>
@@ -630,7 +631,7 @@
           <a:p>
             <a:fld id="{4AF698C7-F98E-7545-B8D5-444C8D9537E9}" type="slidenum">
               <a:rPr lang="de-DE" smtClean="0"/>
-              <a:t>‹#›</a:t>
+              <a:t>‹Nr.›</a:t>
             </a:fld>
             <a:endParaRPr lang="de-DE"/>
           </a:p>
@@ -758,7 +759,7 @@
           <a:p>
             <a:fld id="{881BAD53-E61D-164B-8191-DDA767D1A845}" type="datetimeFigureOut">
               <a:rPr lang="de-DE" smtClean="0"/>
-              <a:t>10.07.16</a:t>
+              <a:t>11.07.2016</a:t>
             </a:fld>
             <a:endParaRPr lang="de-DE"/>
           </a:p>
@@ -800,7 +801,7 @@
           <a:p>
             <a:fld id="{4AF698C7-F98E-7545-B8D5-444C8D9537E9}" type="slidenum">
               <a:rPr lang="de-DE" smtClean="0"/>
-              <a:t>‹#›</a:t>
+              <a:t>‹Nr.›</a:t>
             </a:fld>
             <a:endParaRPr lang="de-DE"/>
           </a:p>
@@ -1004,7 +1005,7 @@
           <a:p>
             <a:fld id="{881BAD53-E61D-164B-8191-DDA767D1A845}" type="datetimeFigureOut">
               <a:rPr lang="de-DE" smtClean="0"/>
-              <a:t>10.07.16</a:t>
+              <a:t>11.07.2016</a:t>
             </a:fld>
             <a:endParaRPr lang="de-DE"/>
           </a:p>
@@ -1046,7 +1047,7 @@
           <a:p>
             <a:fld id="{4AF698C7-F98E-7545-B8D5-444C8D9537E9}" type="slidenum">
               <a:rPr lang="de-DE" smtClean="0"/>
-              <a:t>‹#›</a:t>
+              <a:t>‹Nr.›</a:t>
             </a:fld>
             <a:endParaRPr lang="de-DE"/>
           </a:p>
@@ -1236,7 +1237,7 @@
           <a:p>
             <a:fld id="{881BAD53-E61D-164B-8191-DDA767D1A845}" type="datetimeFigureOut">
               <a:rPr lang="de-DE" smtClean="0"/>
-              <a:t>10.07.16</a:t>
+              <a:t>11.07.2016</a:t>
             </a:fld>
             <a:endParaRPr lang="de-DE"/>
           </a:p>
@@ -1278,7 +1279,7 @@
           <a:p>
             <a:fld id="{4AF698C7-F98E-7545-B8D5-444C8D9537E9}" type="slidenum">
               <a:rPr lang="de-DE" smtClean="0"/>
-              <a:t>‹#›</a:t>
+              <a:t>‹Nr.›</a:t>
             </a:fld>
             <a:endParaRPr lang="de-DE"/>
           </a:p>
@@ -1603,7 +1604,7 @@
           <a:p>
             <a:fld id="{881BAD53-E61D-164B-8191-DDA767D1A845}" type="datetimeFigureOut">
               <a:rPr lang="de-DE" smtClean="0"/>
-              <a:t>10.07.16</a:t>
+              <a:t>11.07.2016</a:t>
             </a:fld>
             <a:endParaRPr lang="de-DE"/>
           </a:p>
@@ -1645,7 +1646,7 @@
           <a:p>
             <a:fld id="{4AF698C7-F98E-7545-B8D5-444C8D9537E9}" type="slidenum">
               <a:rPr lang="de-DE" smtClean="0"/>
-              <a:t>‹#›</a:t>
+              <a:t>‹Nr.›</a:t>
             </a:fld>
             <a:endParaRPr lang="de-DE"/>
           </a:p>
@@ -1721,7 +1722,7 @@
           <a:p>
             <a:fld id="{881BAD53-E61D-164B-8191-DDA767D1A845}" type="datetimeFigureOut">
               <a:rPr lang="de-DE" smtClean="0"/>
-              <a:t>10.07.16</a:t>
+              <a:t>11.07.2016</a:t>
             </a:fld>
             <a:endParaRPr lang="de-DE"/>
           </a:p>
@@ -1763,7 +1764,7 @@
           <a:p>
             <a:fld id="{4AF698C7-F98E-7545-B8D5-444C8D9537E9}" type="slidenum">
               <a:rPr lang="de-DE" smtClean="0"/>
-              <a:t>‹#›</a:t>
+              <a:t>‹Nr.›</a:t>
             </a:fld>
             <a:endParaRPr lang="de-DE"/>
           </a:p>
@@ -1816,7 +1817,7 @@
           <a:p>
             <a:fld id="{881BAD53-E61D-164B-8191-DDA767D1A845}" type="datetimeFigureOut">
               <a:rPr lang="de-DE" smtClean="0"/>
-              <a:t>10.07.16</a:t>
+              <a:t>11.07.2016</a:t>
             </a:fld>
             <a:endParaRPr lang="de-DE"/>
           </a:p>
@@ -1858,7 +1859,7 @@
           <a:p>
             <a:fld id="{4AF698C7-F98E-7545-B8D5-444C8D9537E9}" type="slidenum">
               <a:rPr lang="de-DE" smtClean="0"/>
-              <a:t>‹#›</a:t>
+              <a:t>‹Nr.›</a:t>
             </a:fld>
             <a:endParaRPr lang="de-DE"/>
           </a:p>
@@ -2093,7 +2094,7 @@
           <a:p>
             <a:fld id="{881BAD53-E61D-164B-8191-DDA767D1A845}" type="datetimeFigureOut">
               <a:rPr lang="de-DE" smtClean="0"/>
-              <a:t>10.07.16</a:t>
+              <a:t>11.07.2016</a:t>
             </a:fld>
             <a:endParaRPr lang="de-DE"/>
           </a:p>
@@ -2135,7 +2136,7 @@
           <a:p>
             <a:fld id="{4AF698C7-F98E-7545-B8D5-444C8D9537E9}" type="slidenum">
               <a:rPr lang="de-DE" smtClean="0"/>
-              <a:t>‹#›</a:t>
+              <a:t>‹Nr.›</a:t>
             </a:fld>
             <a:endParaRPr lang="de-DE"/>
           </a:p>
@@ -2346,7 +2347,7 @@
           <a:p>
             <a:fld id="{881BAD53-E61D-164B-8191-DDA767D1A845}" type="datetimeFigureOut">
               <a:rPr lang="de-DE" smtClean="0"/>
-              <a:t>10.07.16</a:t>
+              <a:t>11.07.2016</a:t>
             </a:fld>
             <a:endParaRPr lang="de-DE"/>
           </a:p>
@@ -2388,7 +2389,7 @@
           <a:p>
             <a:fld id="{4AF698C7-F98E-7545-B8D5-444C8D9537E9}" type="slidenum">
               <a:rPr lang="de-DE" smtClean="0"/>
-              <a:t>‹#›</a:t>
+              <a:t>‹Nr.›</a:t>
             </a:fld>
             <a:endParaRPr lang="de-DE"/>
           </a:p>
@@ -2559,7 +2560,7 @@
           <a:p>
             <a:fld id="{881BAD53-E61D-164B-8191-DDA767D1A845}" type="datetimeFigureOut">
               <a:rPr lang="de-DE" smtClean="0"/>
-              <a:t>10.07.16</a:t>
+              <a:t>11.07.2016</a:t>
             </a:fld>
             <a:endParaRPr lang="de-DE"/>
           </a:p>
@@ -2637,7 +2638,7 @@
           <a:p>
             <a:fld id="{4AF698C7-F98E-7545-B8D5-444C8D9537E9}" type="slidenum">
               <a:rPr lang="de-DE" smtClean="0"/>
-              <a:t>‹#›</a:t>
+              <a:t>‹Nr.›</a:t>
             </a:fld>
             <a:endParaRPr lang="de-DE"/>
           </a:p>
@@ -2966,46 +2967,221 @@
       </p:grpSpPr>
       <p:sp>
         <p:nvSpPr>
-          <p:cNvPr id="2" name="Title 1"/>
-          <p:cNvSpPr>
-            <a:spLocks noGrp="1"/>
-          </p:cNvSpPr>
-          <p:nvPr>
-            <p:ph type="ctrTitle"/>
-          </p:nvPr>
-        </p:nvSpPr>
-        <p:spPr/>
-        <p:txBody>
-          <a:bodyPr/>
-          <a:lstStyle/>
-          <a:p>
-            <a:endParaRPr lang="de-DE"/>
-          </a:p>
-        </p:txBody>
-      </p:sp>
-      <p:sp>
-        <p:nvSpPr>
-          <p:cNvPr id="3" name="Subtitle 2"/>
-          <p:cNvSpPr>
-            <a:spLocks noGrp="1"/>
-          </p:cNvSpPr>
-          <p:nvPr>
-            <p:ph type="subTitle" idx="1"/>
-          </p:nvPr>
-        </p:nvSpPr>
-        <p:spPr/>
-        <p:txBody>
-          <a:bodyPr/>
-          <a:lstStyle/>
-          <a:p>
-            <a:endParaRPr lang="de-DE"/>
+          <p:cNvPr id="2" name="Titel 1"/>
+          <p:cNvSpPr>
+            <a:spLocks noGrp="1"/>
+          </p:cNvSpPr>
+          <p:nvPr>
+            <p:ph type="title"/>
+          </p:nvPr>
+        </p:nvSpPr>
+        <p:spPr/>
+        <p:txBody>
+          <a:bodyPr/>
+          <a:lstStyle/>
+          <a:p>
+            <a:r>
+              <a:rPr lang="de-DE" dirty="0" smtClean="0"/>
+              <a:t>Reinforcement Learning - Idee</a:t>
+            </a:r>
+            <a:endParaRPr lang="de-DE" dirty="0"/>
+          </a:p>
+        </p:txBody>
+      </p:sp>
+      <p:sp>
+        <p:nvSpPr>
+          <p:cNvPr id="3" name="Inhaltsplatzhalter 2"/>
+          <p:cNvSpPr>
+            <a:spLocks noGrp="1"/>
+          </p:cNvSpPr>
+          <p:nvPr>
+            <p:ph idx="1"/>
+          </p:nvPr>
+        </p:nvSpPr>
+        <p:spPr/>
+        <p:txBody>
+          <a:bodyPr/>
+          <a:lstStyle/>
+          <a:p>
+            <a:r>
+              <a:rPr lang="de-DE" dirty="0" smtClean="0"/>
+              <a:t>Auswahl der Lieder</a:t>
+            </a:r>
+          </a:p>
+          <a:p>
+            <a:r>
+              <a:rPr lang="de-DE" dirty="0" smtClean="0"/>
+              <a:t>Spieler nicht unter- / überfordern</a:t>
+            </a:r>
+          </a:p>
+          <a:p>
+            <a:r>
+              <a:rPr lang="de-DE" dirty="0" smtClean="0"/>
+              <a:t>Abwechslungsreich</a:t>
+            </a:r>
+          </a:p>
+          <a:p>
+            <a:r>
+              <a:rPr lang="de-DE" dirty="0" smtClean="0"/>
+              <a:t>Berücksichtigung von Biosignalen</a:t>
+            </a:r>
+          </a:p>
+          <a:p>
+            <a:endParaRPr lang="de-DE" dirty="0" smtClean="0"/>
+          </a:p>
+          <a:p>
+            <a:endParaRPr lang="de-DE" dirty="0"/>
           </a:p>
         </p:txBody>
       </p:sp>
     </p:spTree>
     <p:extLst>
       <p:ext uri="{BB962C8B-B14F-4D97-AF65-F5344CB8AC3E}">
-        <p14:creationId xmlns:p14="http://schemas.microsoft.com/office/powerpoint/2010/main" val="2114047628"/>
+        <p14:creationId xmlns:p14="http://schemas.microsoft.com/office/powerpoint/2010/main" val="2355202170"/>
+      </p:ext>
+    </p:extLst>
+  </p:cSld>
+  <p:clrMapOvr>
+    <a:masterClrMapping/>
+  </p:clrMapOvr>
+</p:sld>
+</file>
+
+<file path=ppt/slides/slide2.xml><?xml version="1.0" encoding="utf-8"?>
+<p:sld xmlns:a="http://schemas.openxmlformats.org/drawingml/2006/main" xmlns:r="http://schemas.openxmlformats.org/officeDocument/2006/relationships" xmlns:p="http://schemas.openxmlformats.org/presentationml/2006/main">
+  <p:cSld>
+    <p:spTree>
+      <p:nvGrpSpPr>
+        <p:cNvPr id="1" name=""/>
+        <p:cNvGrpSpPr/>
+        <p:nvPr/>
+      </p:nvGrpSpPr>
+      <p:grpSpPr>
+        <a:xfrm>
+          <a:off x="0" y="0"/>
+          <a:ext cx="0" cy="0"/>
+          <a:chOff x="0" y="0"/>
+          <a:chExt cx="0" cy="0"/>
+        </a:xfrm>
+      </p:grpSpPr>
+      <p:sp>
+        <p:nvSpPr>
+          <p:cNvPr id="2" name="Titel 1"/>
+          <p:cNvSpPr>
+            <a:spLocks noGrp="1"/>
+          </p:cNvSpPr>
+          <p:nvPr>
+            <p:ph type="title"/>
+          </p:nvPr>
+        </p:nvSpPr>
+        <p:spPr/>
+        <p:txBody>
+          <a:bodyPr/>
+          <a:lstStyle/>
+          <a:p>
+            <a:r>
+              <a:rPr lang="de-DE" dirty="0"/>
+              <a:t>Reinforcement Learning - </a:t>
+            </a:r>
+            <a:r>
+              <a:rPr lang="de-DE" dirty="0" smtClean="0"/>
+              <a:t>Umsetzung</a:t>
+            </a:r>
+            <a:endParaRPr lang="de-DE" dirty="0"/>
+          </a:p>
+        </p:txBody>
+      </p:sp>
+      <p:sp>
+        <p:nvSpPr>
+          <p:cNvPr id="3" name="Inhaltsplatzhalter 2"/>
+          <p:cNvSpPr>
+            <a:spLocks noGrp="1"/>
+          </p:cNvSpPr>
+          <p:nvPr>
+            <p:ph idx="1"/>
+          </p:nvPr>
+        </p:nvSpPr>
+        <p:spPr/>
+        <p:txBody>
+          <a:bodyPr/>
+          <a:lstStyle/>
+          <a:p>
+            <a:r>
+              <a:rPr lang="de-DE" dirty="0" smtClean="0"/>
+              <a:t>Zustandsraum: Lieder</a:t>
+            </a:r>
+          </a:p>
+          <a:p>
+            <a:r>
+              <a:rPr lang="de-DE" dirty="0" smtClean="0"/>
+              <a:t>Aktion: Lied auswählen</a:t>
+            </a:r>
+          </a:p>
+          <a:p>
+            <a:pPr lvl="1"/>
+            <a:r>
+              <a:rPr lang="de-DE" dirty="0" smtClean="0"/>
+              <a:t>10 %: Auswahl komplett zufällig</a:t>
+            </a:r>
+          </a:p>
+          <a:p>
+            <a:pPr lvl="1"/>
+            <a:r>
+              <a:rPr lang="de-DE" dirty="0" smtClean="0"/>
+              <a:t>90 %: Auswahl zufällig aus den x am besten geeigneten Lieder</a:t>
+            </a:r>
+          </a:p>
+          <a:p>
+            <a:r>
+              <a:rPr lang="de-DE" dirty="0" smtClean="0"/>
+              <a:t>Belohnung abhängig von:</a:t>
+            </a:r>
+          </a:p>
+          <a:p>
+            <a:pPr lvl="1"/>
+            <a:r>
+              <a:rPr lang="de-DE" dirty="0" smtClean="0"/>
+              <a:t>Abweichung der Score des Spielers zu Referenzwert</a:t>
+            </a:r>
+          </a:p>
+          <a:p>
+            <a:pPr lvl="1"/>
+            <a:r>
+              <a:rPr lang="de-DE" dirty="0" smtClean="0"/>
+              <a:t>Durchschnittlicher Pulse des Spielers</a:t>
+            </a:r>
+            <a:endParaRPr lang="de-DE" dirty="0"/>
+          </a:p>
+          <a:p>
+            <a:pPr>
+              <a:buFont typeface="Symbol"/>
+              <a:buChar char="Þ"/>
+            </a:pPr>
+            <a:r>
+              <a:rPr lang="de-DE" dirty="0" smtClean="0"/>
+              <a:t>Q-Werte-Tabelle repräsentiert die Schwierigkeit eines Liedes</a:t>
+            </a:r>
+          </a:p>
+          <a:p>
+            <a:pPr marL="0" indent="0">
+              <a:buNone/>
+            </a:pPr>
+            <a:r>
+              <a:rPr lang="de-DE" dirty="0"/>
+              <a:t>	</a:t>
+            </a:r>
+            <a:r>
+              <a:rPr lang="de-DE" dirty="0" smtClean="0"/>
+              <a:t>-&gt; Spieler wird nicht unter- oder überfordert</a:t>
+            </a:r>
+            <a:endParaRPr lang="de-DE" dirty="0"/>
+          </a:p>
+        </p:txBody>
+      </p:sp>
+    </p:spTree>
+    <p:extLst>
+      <p:ext uri="{BB962C8B-B14F-4D97-AF65-F5344CB8AC3E}">
+        <p14:creationId xmlns:p14="http://schemas.microsoft.com/office/powerpoint/2010/main" val="4056778447"/>
       </p:ext>
     </p:extLst>
   </p:cSld>
@@ -3270,7 +3446,7 @@
   <a:extraClrSchemeLst/>
   <a:extLst>
     <a:ext uri="{05A4C25C-085E-4340-85A3-A5531E510DB2}">
-      <thm15:themeFamily xmlns:thm15="http://schemas.microsoft.com/office/thememl/2012/main" name="Office Theme" id="{62F939B6-93AF-4DB8-9C6B-D6C7DFDC589F}" vid="{4A3C46E8-61CC-4603-A589-7422A47A8E4A}"/>
+      <thm15:themeFamily xmlns:thm15="http://schemas.microsoft.com/office/thememl/2012/main" xmlns="" name="Office Theme" id="{62F939B6-93AF-4DB8-9C6B-D6C7DFDC589F}" vid="{4A3C46E8-61CC-4603-A589-7422A47A8E4A}"/>
     </a:ext>
   </a:extLst>
 </a:theme>

</xml_diff>